<commit_message>
Finish part of sheriff evaluaiton
</commit_message>
<xml_diff>
--- a/sheriff/figure/sheriff-usecase.pptx
+++ b/sheriff/figure/sheriff-usecase.pptx
@@ -289,7 +289,7 @@
             <a:fld id="{CEB62A1D-6AE4-CA4B-9373-64CCD55BA668}" type="datetimeFigureOut">
               <a:rPr lang="en-US" smtClean="0"/>
               <a:pPr/>
-              <a:t>4/6/11</a:t>
+              <a:t>8/17/11</a:t>
             </a:fld>
             <a:endParaRPr lang="en-US"/>
           </a:p>
@@ -456,7 +456,7 @@
             <a:fld id="{CEB62A1D-6AE4-CA4B-9373-64CCD55BA668}" type="datetimeFigureOut">
               <a:rPr lang="en-US" smtClean="0"/>
               <a:pPr/>
-              <a:t>4/6/11</a:t>
+              <a:t>8/17/11</a:t>
             </a:fld>
             <a:endParaRPr lang="en-US"/>
           </a:p>
@@ -633,7 +633,7 @@
             <a:fld id="{CEB62A1D-6AE4-CA4B-9373-64CCD55BA668}" type="datetimeFigureOut">
               <a:rPr lang="en-US" smtClean="0"/>
               <a:pPr/>
-              <a:t>4/6/11</a:t>
+              <a:t>8/17/11</a:t>
             </a:fld>
             <a:endParaRPr lang="en-US"/>
           </a:p>
@@ -800,7 +800,7 @@
             <a:fld id="{CEB62A1D-6AE4-CA4B-9373-64CCD55BA668}" type="datetimeFigureOut">
               <a:rPr lang="en-US" smtClean="0"/>
               <a:pPr/>
-              <a:t>4/6/11</a:t>
+              <a:t>8/17/11</a:t>
             </a:fld>
             <a:endParaRPr lang="en-US"/>
           </a:p>
@@ -1043,7 +1043,7 @@
             <a:fld id="{CEB62A1D-6AE4-CA4B-9373-64CCD55BA668}" type="datetimeFigureOut">
               <a:rPr lang="en-US" smtClean="0"/>
               <a:pPr/>
-              <a:t>4/6/11</a:t>
+              <a:t>8/17/11</a:t>
             </a:fld>
             <a:endParaRPr lang="en-US"/>
           </a:p>
@@ -1328,7 +1328,7 @@
             <a:fld id="{CEB62A1D-6AE4-CA4B-9373-64CCD55BA668}" type="datetimeFigureOut">
               <a:rPr lang="en-US" smtClean="0"/>
               <a:pPr/>
-              <a:t>4/6/11</a:t>
+              <a:t>8/17/11</a:t>
             </a:fld>
             <a:endParaRPr lang="en-US"/>
           </a:p>
@@ -1747,7 +1747,7 @@
             <a:fld id="{CEB62A1D-6AE4-CA4B-9373-64CCD55BA668}" type="datetimeFigureOut">
               <a:rPr lang="en-US" smtClean="0"/>
               <a:pPr/>
-              <a:t>4/6/11</a:t>
+              <a:t>8/17/11</a:t>
             </a:fld>
             <a:endParaRPr lang="en-US"/>
           </a:p>
@@ -1862,7 +1862,7 @@
             <a:fld id="{CEB62A1D-6AE4-CA4B-9373-64CCD55BA668}" type="datetimeFigureOut">
               <a:rPr lang="en-US" smtClean="0"/>
               <a:pPr/>
-              <a:t>4/6/11</a:t>
+              <a:t>8/17/11</a:t>
             </a:fld>
             <a:endParaRPr lang="en-US"/>
           </a:p>
@@ -1954,7 +1954,7 @@
             <a:fld id="{CEB62A1D-6AE4-CA4B-9373-64CCD55BA668}" type="datetimeFigureOut">
               <a:rPr lang="en-US" smtClean="0"/>
               <a:pPr/>
-              <a:t>4/6/11</a:t>
+              <a:t>8/17/11</a:t>
             </a:fld>
             <a:endParaRPr lang="en-US"/>
           </a:p>
@@ -2228,7 +2228,7 @@
             <a:fld id="{CEB62A1D-6AE4-CA4B-9373-64CCD55BA668}" type="datetimeFigureOut">
               <a:rPr lang="en-US" smtClean="0"/>
               <a:pPr/>
-              <a:t>4/6/11</a:t>
+              <a:t>8/17/11</a:t>
             </a:fld>
             <a:endParaRPr lang="en-US"/>
           </a:p>
@@ -2478,7 +2478,7 @@
             <a:fld id="{CEB62A1D-6AE4-CA4B-9373-64CCD55BA668}" type="datetimeFigureOut">
               <a:rPr lang="en-US" smtClean="0"/>
               <a:pPr/>
-              <a:t>4/6/11</a:t>
+              <a:t>8/17/11</a:t>
             </a:fld>
             <a:endParaRPr lang="en-US"/>
           </a:p>
@@ -2688,7 +2688,7 @@
             <a:fld id="{CEB62A1D-6AE4-CA4B-9373-64CCD55BA668}" type="datetimeFigureOut">
               <a:rPr lang="en-US" smtClean="0"/>
               <a:pPr/>
-              <a:t>4/6/11</a:t>
+              <a:t>8/17/11</a:t>
             </a:fld>
             <a:endParaRPr lang="en-US"/>
           </a:p>
@@ -3090,7 +3090,6 @@
               <a:rPr lang="en-US" sz="1400" i="1" dirty="0" smtClean="0"/>
               <a:t>o false sharing</a:t>
             </a:r>
-            <a:endParaRPr lang="en-US" sz="1400" i="1" dirty="0" smtClean="0"/>
           </a:p>
         </p:txBody>
       </p:sp>
@@ -3211,7 +3210,7 @@
                   <a:srgbClr val="000000"/>
                 </a:solidFill>
               </a:rPr>
-              <a:t>FS-</a:t>
+              <a:t>S</a:t>
             </a:r>
             <a:r>
               <a:rPr lang="en-US" cap="small" dirty="0" smtClean="0">
@@ -3219,7 +3218,23 @@
                   <a:srgbClr val="000000"/>
                 </a:solidFill>
               </a:rPr>
-              <a:t>Detective</a:t>
+              <a:t>heriff</a:t>
+            </a:r>
+            <a:r>
+              <a:rPr lang="en-US" dirty="0" smtClean="0">
+                <a:solidFill>
+                  <a:srgbClr val="000000"/>
+                </a:solidFill>
+              </a:rPr>
+              <a:t>-</a:t>
+            </a:r>
+            <a:r>
+              <a:rPr lang="en-US" cap="small" dirty="0" smtClean="0">
+                <a:solidFill>
+                  <a:srgbClr val="000000"/>
+                </a:solidFill>
+              </a:rPr>
+              <a:t>Detect</a:t>
             </a:r>
             <a:endParaRPr lang="en-US" cap="small" dirty="0">
               <a:solidFill>
@@ -3309,7 +3324,7 @@
         </p:nvSpPr>
         <p:spPr>
           <a:xfrm>
-            <a:off x="3501764" y="1012883"/>
+            <a:off x="3565264" y="1012883"/>
             <a:ext cx="1767605" cy="1169551"/>
           </a:xfrm>
           <a:prstGeom prst="rect">
@@ -3334,20 +3349,36 @@
               <a:t>se </a:t>
             </a:r>
             <a:r>
-              <a:rPr lang="en-US" sz="1400" dirty="0">
+              <a:rPr lang="en-US" sz="1400" dirty="0" smtClean="0">
                 <a:solidFill>
                   <a:srgbClr val="000000"/>
                 </a:solidFill>
               </a:rPr>
-              <a:t>FS-</a:t>
-            </a:r>
-            <a:r>
-              <a:rPr lang="en-US" sz="1400" cap="small" dirty="0">
+              <a:t>S</a:t>
+            </a:r>
+            <a:r>
+              <a:rPr lang="en-US" sz="1400" cap="small" dirty="0" smtClean="0">
                 <a:solidFill>
                   <a:srgbClr val="000000"/>
                 </a:solidFill>
               </a:rPr>
-              <a:t>Detective </a:t>
+              <a:t>heriff</a:t>
+            </a:r>
+            <a:r>
+              <a:rPr lang="en-US" sz="1400" dirty="0" smtClean="0">
+                <a:solidFill>
+                  <a:srgbClr val="000000"/>
+                </a:solidFill>
+              </a:rPr>
+              <a:t>-</a:t>
+            </a:r>
+            <a:r>
+              <a:rPr lang="en-US" sz="1400" cap="small" dirty="0" smtClean="0">
+                <a:solidFill>
+                  <a:srgbClr val="000000"/>
+                </a:solidFill>
+              </a:rPr>
+              <a:t>Detect </a:t>
             </a:r>
             <a:r>
               <a:rPr lang="en-US" sz="1400" i="1" dirty="0"/>
@@ -3378,7 +3409,6 @@
               <a:rPr lang="en-US" sz="1400" i="1" dirty="0" smtClean="0"/>
               <a:t>alignment) </a:t>
             </a:r>
-            <a:endParaRPr lang="en-US" sz="1400" i="1" dirty="0" smtClean="0"/>
           </a:p>
         </p:txBody>
       </p:sp>
@@ -3797,20 +3827,36 @@
           <a:p>
             <a:pPr algn="ctr"/>
             <a:r>
-              <a:rPr lang="en-US" dirty="0">
+              <a:rPr lang="en-US" dirty="0" smtClean="0">
                 <a:solidFill>
                   <a:srgbClr val="000000"/>
                 </a:solidFill>
               </a:rPr>
-              <a:t>FS-</a:t>
-            </a:r>
-            <a:r>
-              <a:rPr lang="en-US" cap="small" dirty="0">
+              <a:t>S</a:t>
+            </a:r>
+            <a:r>
+              <a:rPr lang="en-US" cap="small" dirty="0" smtClean="0">
                 <a:solidFill>
                   <a:srgbClr val="000000"/>
                 </a:solidFill>
               </a:rPr>
-              <a:t>Patrol</a:t>
+              <a:t>heriff</a:t>
+            </a:r>
+            <a:r>
+              <a:rPr lang="en-US" dirty="0" smtClean="0">
+                <a:solidFill>
+                  <a:srgbClr val="000000"/>
+                </a:solidFill>
+              </a:rPr>
+              <a:t>-</a:t>
+            </a:r>
+            <a:r>
+              <a:rPr lang="en-US" cap="small" dirty="0" smtClean="0">
+                <a:solidFill>
+                  <a:srgbClr val="000000"/>
+                </a:solidFill>
+              </a:rPr>
+              <a:t>Protect</a:t>
             </a:r>
             <a:endParaRPr lang="en-US" cap="small" dirty="0">
               <a:solidFill>
@@ -3958,7 +4004,6 @@
               <a:rPr lang="en-US" sz="1400" i="1" dirty="0" smtClean="0"/>
               <a:t>modifications degrade performance or cause excess memory consumption</a:t>
             </a:r>
-            <a:endParaRPr lang="en-US" sz="1400" i="1" dirty="0" smtClean="0"/>
           </a:p>
         </p:txBody>
       </p:sp>
@@ -3970,8 +4015,8 @@
         </p:nvSpPr>
         <p:spPr>
           <a:xfrm>
-            <a:off x="2934603" y="2553539"/>
-            <a:ext cx="2352834" cy="738664"/>
+            <a:off x="2866866" y="2553539"/>
+            <a:ext cx="2488310" cy="738664"/>
           </a:xfrm>
           <a:prstGeom prst="rect">
             <a:avLst/>
@@ -4009,12 +4054,12 @@
               <a:t>to act on </a:t>
             </a:r>
             <a:r>
-              <a:rPr lang="en-US" sz="1400" dirty="0">
+              <a:rPr lang="en-US" sz="1400" dirty="0" smtClean="0">
                 <a:solidFill>
                   <a:srgbClr val="000000"/>
                 </a:solidFill>
               </a:rPr>
-              <a:t>FS-</a:t>
+              <a:t>S</a:t>
             </a:r>
             <a:r>
               <a:rPr lang="en-US" sz="1400" cap="small" dirty="0" smtClean="0">
@@ -4022,13 +4067,28 @@
                   <a:srgbClr val="000000"/>
                 </a:solidFill>
               </a:rPr>
-              <a:t>Detective </a:t>
+              <a:t>heriff</a:t>
+            </a:r>
+            <a:r>
+              <a:rPr lang="en-US" sz="1400" dirty="0" smtClean="0">
+                <a:solidFill>
+                  <a:srgbClr val="000000"/>
+                </a:solidFill>
+              </a:rPr>
+              <a:t>-</a:t>
+            </a:r>
+            <a:r>
+              <a:rPr lang="en-US" sz="1400" cap="small" dirty="0" smtClean="0">
+                <a:solidFill>
+                  <a:srgbClr val="000000"/>
+                </a:solidFill>
+              </a:rPr>
+              <a:t>Detect </a:t>
             </a:r>
             <a:r>
               <a:rPr lang="en-US" sz="1400" i="1" dirty="0" smtClean="0"/>
               <a:t>reports </a:t>
             </a:r>
-            <a:endParaRPr lang="en-US" sz="1400" i="1" dirty="0" smtClean="0"/>
           </a:p>
         </p:txBody>
       </p:sp>

</xml_diff>